<commit_message>
Add UI diagrams to Appendix 4
</commit_message>
<xml_diff>
--- a/Design/UIDesign/acting_multi_word.pptx
+++ b/Design/UIDesign/acting_multi_word.pptx
@@ -112,6 +112,10 @@
 </p:presentation>
 </file>
 
+<file path=ppt/revisionInfo.xml><?xml version="1.0" encoding="utf-8"?>
+<p1510:revInfo xmlns:a="http://schemas.openxmlformats.org/drawingml/2006/main" xmlns:r="http://schemas.openxmlformats.org/officeDocument/2006/relationships" xmlns:p1510="http://schemas.microsoft.com/office/powerpoint/2015/10/main"/>
+</file>
+
 <file path=ppt/slideLayouts/slideLayout1.xml><?xml version="1.0" encoding="utf-8"?>
 <p:sldLayout xmlns:a="http://schemas.openxmlformats.org/drawingml/2006/main" xmlns:r="http://schemas.openxmlformats.org/officeDocument/2006/relationships" xmlns:p="http://schemas.openxmlformats.org/presentationml/2006/main" type="title" preserve="1">
   <p:cSld name="Title Slide">
@@ -243,7 +247,7 @@
           <a:p>
             <a:fld id="{DC9AFC99-8CBA-4602-827C-86159FB432DE}" type="datetimeFigureOut">
               <a:rPr lang="en-GB" smtClean="0"/>
-              <a:t>28/03/2017</a:t>
+              <a:t>07/05/2017</a:t>
             </a:fld>
             <a:endParaRPr lang="en-GB"/>
           </a:p>
@@ -413,7 +417,7 @@
           <a:p>
             <a:fld id="{DC9AFC99-8CBA-4602-827C-86159FB432DE}" type="datetimeFigureOut">
               <a:rPr lang="en-GB" smtClean="0"/>
-              <a:t>28/03/2017</a:t>
+              <a:t>07/05/2017</a:t>
             </a:fld>
             <a:endParaRPr lang="en-GB"/>
           </a:p>
@@ -593,7 +597,7 @@
           <a:p>
             <a:fld id="{DC9AFC99-8CBA-4602-827C-86159FB432DE}" type="datetimeFigureOut">
               <a:rPr lang="en-GB" smtClean="0"/>
-              <a:t>28/03/2017</a:t>
+              <a:t>07/05/2017</a:t>
             </a:fld>
             <a:endParaRPr lang="en-GB"/>
           </a:p>
@@ -763,7 +767,7 @@
           <a:p>
             <a:fld id="{DC9AFC99-8CBA-4602-827C-86159FB432DE}" type="datetimeFigureOut">
               <a:rPr lang="en-GB" smtClean="0"/>
-              <a:t>28/03/2017</a:t>
+              <a:t>07/05/2017</a:t>
             </a:fld>
             <a:endParaRPr lang="en-GB"/>
           </a:p>
@@ -1009,7 +1013,7 @@
           <a:p>
             <a:fld id="{DC9AFC99-8CBA-4602-827C-86159FB432DE}" type="datetimeFigureOut">
               <a:rPr lang="en-GB" smtClean="0"/>
-              <a:t>28/03/2017</a:t>
+              <a:t>07/05/2017</a:t>
             </a:fld>
             <a:endParaRPr lang="en-GB"/>
           </a:p>
@@ -1241,7 +1245,7 @@
           <a:p>
             <a:fld id="{DC9AFC99-8CBA-4602-827C-86159FB432DE}" type="datetimeFigureOut">
               <a:rPr lang="en-GB" smtClean="0"/>
-              <a:t>28/03/2017</a:t>
+              <a:t>07/05/2017</a:t>
             </a:fld>
             <a:endParaRPr lang="en-GB"/>
           </a:p>
@@ -1608,7 +1612,7 @@
           <a:p>
             <a:fld id="{DC9AFC99-8CBA-4602-827C-86159FB432DE}" type="datetimeFigureOut">
               <a:rPr lang="en-GB" smtClean="0"/>
-              <a:t>28/03/2017</a:t>
+              <a:t>07/05/2017</a:t>
             </a:fld>
             <a:endParaRPr lang="en-GB"/>
           </a:p>
@@ -1726,7 +1730,7 @@
           <a:p>
             <a:fld id="{DC9AFC99-8CBA-4602-827C-86159FB432DE}" type="datetimeFigureOut">
               <a:rPr lang="en-GB" smtClean="0"/>
-              <a:t>28/03/2017</a:t>
+              <a:t>07/05/2017</a:t>
             </a:fld>
             <a:endParaRPr lang="en-GB"/>
           </a:p>
@@ -1821,7 +1825,7 @@
           <a:p>
             <a:fld id="{DC9AFC99-8CBA-4602-827C-86159FB432DE}" type="datetimeFigureOut">
               <a:rPr lang="en-GB" smtClean="0"/>
-              <a:t>28/03/2017</a:t>
+              <a:t>07/05/2017</a:t>
             </a:fld>
             <a:endParaRPr lang="en-GB"/>
           </a:p>
@@ -2098,7 +2102,7 @@
           <a:p>
             <a:fld id="{DC9AFC99-8CBA-4602-827C-86159FB432DE}" type="datetimeFigureOut">
               <a:rPr lang="en-GB" smtClean="0"/>
-              <a:t>28/03/2017</a:t>
+              <a:t>07/05/2017</a:t>
             </a:fld>
             <a:endParaRPr lang="en-GB"/>
           </a:p>
@@ -2351,7 +2355,7 @@
           <a:p>
             <a:fld id="{DC9AFC99-8CBA-4602-827C-86159FB432DE}" type="datetimeFigureOut">
               <a:rPr lang="en-GB" smtClean="0"/>
-              <a:t>28/03/2017</a:t>
+              <a:t>07/05/2017</a:t>
             </a:fld>
             <a:endParaRPr lang="en-GB"/>
           </a:p>
@@ -2564,7 +2568,7 @@
           <a:p>
             <a:fld id="{DC9AFC99-8CBA-4602-827C-86159FB432DE}" type="datetimeFigureOut">
               <a:rPr lang="en-GB" smtClean="0"/>
-              <a:t>28/03/2017</a:t>
+              <a:t>07/05/2017</a:t>
             </a:fld>
             <a:endParaRPr lang="en-GB"/>
           </a:p>
@@ -3067,7 +3071,15 @@
                   <a:schemeClr val="bg1"/>
                 </a:solidFill>
               </a:rPr>
-              <a:t> phrase</a:t>
+              <a:t> </a:t>
+            </a:r>
+            <a:r>
+              <a:rPr lang="en-GB" sz="4000" dirty="0">
+                <a:solidFill>
+                  <a:srgbClr val="FFC000"/>
+                </a:solidFill>
+              </a:rPr>
+              <a:t>phrase</a:t>
             </a:r>
           </a:p>
         </p:txBody>
@@ -3080,7 +3092,7 @@
         </p:nvSpPr>
         <p:spPr>
           <a:xfrm>
-            <a:off x="2521590" y="4152893"/>
+            <a:off x="3108820" y="4152893"/>
             <a:ext cx="1694576" cy="562062"/>
           </a:xfrm>
           <a:prstGeom prst="rect">
@@ -3169,12 +3181,15 @@
         </p:nvSpPr>
         <p:spPr>
           <a:xfrm>
-            <a:off x="7975832" y="4152893"/>
+            <a:off x="7346657" y="4152893"/>
             <a:ext cx="1694576" cy="562062"/>
           </a:xfrm>
           <a:prstGeom prst="rect">
             <a:avLst/>
           </a:prstGeom>
+          <a:solidFill>
+            <a:srgbClr val="FFC000"/>
+          </a:solidFill>
         </p:spPr>
         <p:style>
           <a:lnRef idx="2">

</xml_diff>